<commit_message>
align copy of IUA and HIE-Whitepaper
</commit_message>
<xml_diff>
--- a/ITI/HIE-Whitepaper/images/mXDE.pptx
+++ b/ITI/HIE-Whitepaper/images/mXDE.pptx
@@ -107,6 +107,11 @@
       </a:defRPr>
     </a:lvl9pPr>
   </p:defaultTextStyle>
+  <p:extLst>
+    <p:ext uri="{EFAFB233-063F-42B5-8137-9DF3F51BA10A}">
+      <p15:sldGuideLst xmlns:p15="http://schemas.microsoft.com/office/powerpoint/2012/main"/>
+    </p:ext>
+  </p:extLst>
 </p:presentation>
 </file>
 
@@ -192,7 +197,7 @@
           <a:p>
             <a:fld id="{04DBF7ED-895B-479E-B19F-02134FB4D339}" type="datetimeFigureOut">
               <a:rPr lang="en-US" smtClean="0"/>
-              <a:t>9/15/2020</a:t>
+              <a:t>10/12/2020</a:t>
             </a:fld>
             <a:endParaRPr lang="en-US"/>
           </a:p>
@@ -690,7 +695,7 @@
           <a:p>
             <a:fld id="{33175658-71C5-4CBA-8B43-B22F96899DB9}" type="datetimeFigureOut">
               <a:rPr lang="en-US" smtClean="0"/>
-              <a:t>9/15/2020</a:t>
+              <a:t>10/12/2020</a:t>
             </a:fld>
             <a:endParaRPr lang="en-US"/>
           </a:p>
@@ -888,7 +893,7 @@
           <a:p>
             <a:fld id="{33175658-71C5-4CBA-8B43-B22F96899DB9}" type="datetimeFigureOut">
               <a:rPr lang="en-US" smtClean="0"/>
-              <a:t>9/15/2020</a:t>
+              <a:t>10/12/2020</a:t>
             </a:fld>
             <a:endParaRPr lang="en-US"/>
           </a:p>
@@ -1096,7 +1101,7 @@
           <a:p>
             <a:fld id="{33175658-71C5-4CBA-8B43-B22F96899DB9}" type="datetimeFigureOut">
               <a:rPr lang="en-US" smtClean="0"/>
-              <a:t>9/15/2020</a:t>
+              <a:t>10/12/2020</a:t>
             </a:fld>
             <a:endParaRPr lang="en-US"/>
           </a:p>
@@ -1294,7 +1299,7 @@
           <a:p>
             <a:fld id="{33175658-71C5-4CBA-8B43-B22F96899DB9}" type="datetimeFigureOut">
               <a:rPr lang="en-US" smtClean="0"/>
-              <a:t>9/15/2020</a:t>
+              <a:t>10/12/2020</a:t>
             </a:fld>
             <a:endParaRPr lang="en-US"/>
           </a:p>
@@ -1569,7 +1574,7 @@
           <a:p>
             <a:fld id="{33175658-71C5-4CBA-8B43-B22F96899DB9}" type="datetimeFigureOut">
               <a:rPr lang="en-US" smtClean="0"/>
-              <a:t>9/15/2020</a:t>
+              <a:t>10/12/2020</a:t>
             </a:fld>
             <a:endParaRPr lang="en-US"/>
           </a:p>
@@ -1834,7 +1839,7 @@
           <a:p>
             <a:fld id="{33175658-71C5-4CBA-8B43-B22F96899DB9}" type="datetimeFigureOut">
               <a:rPr lang="en-US" smtClean="0"/>
-              <a:t>9/15/2020</a:t>
+              <a:t>10/12/2020</a:t>
             </a:fld>
             <a:endParaRPr lang="en-US"/>
           </a:p>
@@ -2246,7 +2251,7 @@
           <a:p>
             <a:fld id="{33175658-71C5-4CBA-8B43-B22F96899DB9}" type="datetimeFigureOut">
               <a:rPr lang="en-US" smtClean="0"/>
-              <a:t>9/15/2020</a:t>
+              <a:t>10/12/2020</a:t>
             </a:fld>
             <a:endParaRPr lang="en-US"/>
           </a:p>
@@ -2387,7 +2392,7 @@
           <a:p>
             <a:fld id="{33175658-71C5-4CBA-8B43-B22F96899DB9}" type="datetimeFigureOut">
               <a:rPr lang="en-US" smtClean="0"/>
-              <a:t>9/15/2020</a:t>
+              <a:t>10/12/2020</a:t>
             </a:fld>
             <a:endParaRPr lang="en-US"/>
           </a:p>
@@ -2500,7 +2505,7 @@
           <a:p>
             <a:fld id="{33175658-71C5-4CBA-8B43-B22F96899DB9}" type="datetimeFigureOut">
               <a:rPr lang="en-US" smtClean="0"/>
-              <a:t>9/15/2020</a:t>
+              <a:t>10/12/2020</a:t>
             </a:fld>
             <a:endParaRPr lang="en-US"/>
           </a:p>
@@ -2811,7 +2816,7 @@
           <a:p>
             <a:fld id="{33175658-71C5-4CBA-8B43-B22F96899DB9}" type="datetimeFigureOut">
               <a:rPr lang="en-US" smtClean="0"/>
-              <a:t>9/15/2020</a:t>
+              <a:t>10/12/2020</a:t>
             </a:fld>
             <a:endParaRPr lang="en-US"/>
           </a:p>
@@ -3099,7 +3104,7 @@
           <a:p>
             <a:fld id="{33175658-71C5-4CBA-8B43-B22F96899DB9}" type="datetimeFigureOut">
               <a:rPr lang="en-US" smtClean="0"/>
-              <a:t>9/15/2020</a:t>
+              <a:t>10/12/2020</a:t>
             </a:fld>
             <a:endParaRPr lang="en-US"/>
           </a:p>
@@ -3340,7 +3345,7 @@
           <a:p>
             <a:fld id="{33175658-71C5-4CBA-8B43-B22F96899DB9}" type="datetimeFigureOut">
               <a:rPr lang="en-US" smtClean="0"/>
-              <a:t>9/15/2020</a:t>
+              <a:t>10/12/2020</a:t>
             </a:fld>
             <a:endParaRPr lang="en-US"/>
           </a:p>
@@ -5688,6 +5693,214 @@
           <a:p>
             <a:pPr algn="ctr"/>
             <a:endParaRPr lang="en-US"/>
+          </a:p>
+        </p:txBody>
+      </p:sp>
+      <p:sp>
+        <p:nvSpPr>
+          <p:cNvPr id="9" name="Oval 8">
+            <a:extLst>
+              <a:ext uri="{FF2B5EF4-FFF2-40B4-BE49-F238E27FC236}">
+                <a16:creationId xmlns:a16="http://schemas.microsoft.com/office/drawing/2014/main" id="{D5C82B20-3255-49A0-8FE2-857EC909BBD8}"/>
+              </a:ext>
+            </a:extLst>
+          </p:cNvPr>
+          <p:cNvSpPr/>
+          <p:nvPr/>
+        </p:nvSpPr>
+        <p:spPr>
+          <a:xfrm>
+            <a:off x="1757791" y="1252855"/>
+            <a:ext cx="477433" cy="493299"/>
+          </a:xfrm>
+          <a:prstGeom prst="ellipse">
+            <a:avLst/>
+          </a:prstGeom>
+          <a:solidFill>
+            <a:srgbClr val="CA3ECA"/>
+          </a:solidFill>
+        </p:spPr>
+        <p:style>
+          <a:lnRef idx="2">
+            <a:schemeClr val="accent1">
+              <a:shade val="50000"/>
+            </a:schemeClr>
+          </a:lnRef>
+          <a:fillRef idx="1">
+            <a:schemeClr val="accent1"/>
+          </a:fillRef>
+          <a:effectRef idx="0">
+            <a:schemeClr val="accent1"/>
+          </a:effectRef>
+          <a:fontRef idx="minor">
+            <a:schemeClr val="lt1"/>
+          </a:fontRef>
+        </p:style>
+        <p:txBody>
+          <a:bodyPr rtlCol="0" anchor="ctr"/>
+          <a:lstStyle/>
+          <a:p>
+            <a:pPr algn="ctr"/>
+            <a:r>
+              <a:rPr lang="en-US" sz="4000" b="1" dirty="0"/>
+              <a:t>1</a:t>
+            </a:r>
+          </a:p>
+        </p:txBody>
+      </p:sp>
+      <p:sp>
+        <p:nvSpPr>
+          <p:cNvPr id="59" name="Oval 58">
+            <a:extLst>
+              <a:ext uri="{FF2B5EF4-FFF2-40B4-BE49-F238E27FC236}">
+                <a16:creationId xmlns:a16="http://schemas.microsoft.com/office/drawing/2014/main" id="{DDF9F025-C44A-476D-879A-0092C64A0653}"/>
+              </a:ext>
+            </a:extLst>
+          </p:cNvPr>
+          <p:cNvSpPr/>
+          <p:nvPr/>
+        </p:nvSpPr>
+        <p:spPr>
+          <a:xfrm>
+            <a:off x="5366735" y="1283793"/>
+            <a:ext cx="477433" cy="493299"/>
+          </a:xfrm>
+          <a:prstGeom prst="ellipse">
+            <a:avLst/>
+          </a:prstGeom>
+          <a:solidFill>
+            <a:srgbClr val="CA3ECA"/>
+          </a:solidFill>
+        </p:spPr>
+        <p:style>
+          <a:lnRef idx="2">
+            <a:schemeClr val="accent1">
+              <a:shade val="50000"/>
+            </a:schemeClr>
+          </a:lnRef>
+          <a:fillRef idx="1">
+            <a:schemeClr val="accent1"/>
+          </a:fillRef>
+          <a:effectRef idx="0">
+            <a:schemeClr val="accent1"/>
+          </a:effectRef>
+          <a:fontRef idx="minor">
+            <a:schemeClr val="lt1"/>
+          </a:fontRef>
+        </p:style>
+        <p:txBody>
+          <a:bodyPr rtlCol="0" anchor="ctr"/>
+          <a:lstStyle/>
+          <a:p>
+            <a:pPr algn="ctr"/>
+            <a:r>
+              <a:rPr lang="en-US" sz="4000" b="1" dirty="0"/>
+              <a:t>2</a:t>
+            </a:r>
+          </a:p>
+        </p:txBody>
+      </p:sp>
+      <p:sp>
+        <p:nvSpPr>
+          <p:cNvPr id="60" name="Oval 59">
+            <a:extLst>
+              <a:ext uri="{FF2B5EF4-FFF2-40B4-BE49-F238E27FC236}">
+                <a16:creationId xmlns:a16="http://schemas.microsoft.com/office/drawing/2014/main" id="{956C33E4-41E8-480A-8EAE-3143C177F953}"/>
+              </a:ext>
+            </a:extLst>
+          </p:cNvPr>
+          <p:cNvSpPr/>
+          <p:nvPr/>
+        </p:nvSpPr>
+        <p:spPr>
+          <a:xfrm>
+            <a:off x="7668768" y="6076088"/>
+            <a:ext cx="477433" cy="493299"/>
+          </a:xfrm>
+          <a:prstGeom prst="ellipse">
+            <a:avLst/>
+          </a:prstGeom>
+          <a:solidFill>
+            <a:srgbClr val="CA3ECA"/>
+          </a:solidFill>
+        </p:spPr>
+        <p:style>
+          <a:lnRef idx="2">
+            <a:schemeClr val="accent1">
+              <a:shade val="50000"/>
+            </a:schemeClr>
+          </a:lnRef>
+          <a:fillRef idx="1">
+            <a:schemeClr val="accent1"/>
+          </a:fillRef>
+          <a:effectRef idx="0">
+            <a:schemeClr val="accent1"/>
+          </a:effectRef>
+          <a:fontRef idx="minor">
+            <a:schemeClr val="lt1"/>
+          </a:fontRef>
+        </p:style>
+        <p:txBody>
+          <a:bodyPr rtlCol="0" anchor="ctr"/>
+          <a:lstStyle/>
+          <a:p>
+            <a:pPr algn="ctr"/>
+            <a:r>
+              <a:rPr lang="en-US" sz="4000" b="1" dirty="0"/>
+              <a:t>4</a:t>
+            </a:r>
+          </a:p>
+        </p:txBody>
+      </p:sp>
+      <p:sp>
+        <p:nvSpPr>
+          <p:cNvPr id="61" name="Oval 60">
+            <a:extLst>
+              <a:ext uri="{FF2B5EF4-FFF2-40B4-BE49-F238E27FC236}">
+                <a16:creationId xmlns:a16="http://schemas.microsoft.com/office/drawing/2014/main" id="{31609A51-451C-4CA2-B453-ABFFEFEDFED3}"/>
+              </a:ext>
+            </a:extLst>
+          </p:cNvPr>
+          <p:cNvSpPr/>
+          <p:nvPr/>
+        </p:nvSpPr>
+        <p:spPr>
+          <a:xfrm>
+            <a:off x="9416423" y="2491206"/>
+            <a:ext cx="477433" cy="493299"/>
+          </a:xfrm>
+          <a:prstGeom prst="ellipse">
+            <a:avLst/>
+          </a:prstGeom>
+          <a:solidFill>
+            <a:srgbClr val="CA3ECA"/>
+          </a:solidFill>
+        </p:spPr>
+        <p:style>
+          <a:lnRef idx="2">
+            <a:schemeClr val="accent1">
+              <a:shade val="50000"/>
+            </a:schemeClr>
+          </a:lnRef>
+          <a:fillRef idx="1">
+            <a:schemeClr val="accent1"/>
+          </a:fillRef>
+          <a:effectRef idx="0">
+            <a:schemeClr val="accent1"/>
+          </a:effectRef>
+          <a:fontRef idx="minor">
+            <a:schemeClr val="lt1"/>
+          </a:fontRef>
+        </p:style>
+        <p:txBody>
+          <a:bodyPr rtlCol="0" anchor="ctr"/>
+          <a:lstStyle/>
+          <a:p>
+            <a:pPr algn="ctr"/>
+            <a:r>
+              <a:rPr lang="en-US" sz="4000" b="1" dirty="0"/>
+              <a:t>3</a:t>
+            </a:r>
           </a:p>
         </p:txBody>
       </p:sp>

</xml_diff>

<commit_message>
update web version of HIE-Whitepaper and IUA - and remove MHD
</commit_message>
<xml_diff>
--- a/ITI/HIE-Whitepaper/images/mXDE.pptx
+++ b/ITI/HIE-Whitepaper/images/mXDE.pptx
@@ -107,6 +107,11 @@
       </a:defRPr>
     </a:lvl9pPr>
   </p:defaultTextStyle>
+  <p:extLst>
+    <p:ext uri="{EFAFB233-063F-42B5-8137-9DF3F51BA10A}">
+      <p15:sldGuideLst xmlns:p15="http://schemas.microsoft.com/office/powerpoint/2012/main"/>
+    </p:ext>
+  </p:extLst>
 </p:presentation>
 </file>
 
@@ -192,7 +197,7 @@
           <a:p>
             <a:fld id="{04DBF7ED-895B-479E-B19F-02134FB4D339}" type="datetimeFigureOut">
               <a:rPr lang="en-US" smtClean="0"/>
-              <a:t>9/15/2020</a:t>
+              <a:t>10/12/2020</a:t>
             </a:fld>
             <a:endParaRPr lang="en-US"/>
           </a:p>
@@ -690,7 +695,7 @@
           <a:p>
             <a:fld id="{33175658-71C5-4CBA-8B43-B22F96899DB9}" type="datetimeFigureOut">
               <a:rPr lang="en-US" smtClean="0"/>
-              <a:t>9/15/2020</a:t>
+              <a:t>10/12/2020</a:t>
             </a:fld>
             <a:endParaRPr lang="en-US"/>
           </a:p>
@@ -888,7 +893,7 @@
           <a:p>
             <a:fld id="{33175658-71C5-4CBA-8B43-B22F96899DB9}" type="datetimeFigureOut">
               <a:rPr lang="en-US" smtClean="0"/>
-              <a:t>9/15/2020</a:t>
+              <a:t>10/12/2020</a:t>
             </a:fld>
             <a:endParaRPr lang="en-US"/>
           </a:p>
@@ -1096,7 +1101,7 @@
           <a:p>
             <a:fld id="{33175658-71C5-4CBA-8B43-B22F96899DB9}" type="datetimeFigureOut">
               <a:rPr lang="en-US" smtClean="0"/>
-              <a:t>9/15/2020</a:t>
+              <a:t>10/12/2020</a:t>
             </a:fld>
             <a:endParaRPr lang="en-US"/>
           </a:p>
@@ -1294,7 +1299,7 @@
           <a:p>
             <a:fld id="{33175658-71C5-4CBA-8B43-B22F96899DB9}" type="datetimeFigureOut">
               <a:rPr lang="en-US" smtClean="0"/>
-              <a:t>9/15/2020</a:t>
+              <a:t>10/12/2020</a:t>
             </a:fld>
             <a:endParaRPr lang="en-US"/>
           </a:p>
@@ -1569,7 +1574,7 @@
           <a:p>
             <a:fld id="{33175658-71C5-4CBA-8B43-B22F96899DB9}" type="datetimeFigureOut">
               <a:rPr lang="en-US" smtClean="0"/>
-              <a:t>9/15/2020</a:t>
+              <a:t>10/12/2020</a:t>
             </a:fld>
             <a:endParaRPr lang="en-US"/>
           </a:p>
@@ -1834,7 +1839,7 @@
           <a:p>
             <a:fld id="{33175658-71C5-4CBA-8B43-B22F96899DB9}" type="datetimeFigureOut">
               <a:rPr lang="en-US" smtClean="0"/>
-              <a:t>9/15/2020</a:t>
+              <a:t>10/12/2020</a:t>
             </a:fld>
             <a:endParaRPr lang="en-US"/>
           </a:p>
@@ -2246,7 +2251,7 @@
           <a:p>
             <a:fld id="{33175658-71C5-4CBA-8B43-B22F96899DB9}" type="datetimeFigureOut">
               <a:rPr lang="en-US" smtClean="0"/>
-              <a:t>9/15/2020</a:t>
+              <a:t>10/12/2020</a:t>
             </a:fld>
             <a:endParaRPr lang="en-US"/>
           </a:p>
@@ -2387,7 +2392,7 @@
           <a:p>
             <a:fld id="{33175658-71C5-4CBA-8B43-B22F96899DB9}" type="datetimeFigureOut">
               <a:rPr lang="en-US" smtClean="0"/>
-              <a:t>9/15/2020</a:t>
+              <a:t>10/12/2020</a:t>
             </a:fld>
             <a:endParaRPr lang="en-US"/>
           </a:p>
@@ -2500,7 +2505,7 @@
           <a:p>
             <a:fld id="{33175658-71C5-4CBA-8B43-B22F96899DB9}" type="datetimeFigureOut">
               <a:rPr lang="en-US" smtClean="0"/>
-              <a:t>9/15/2020</a:t>
+              <a:t>10/12/2020</a:t>
             </a:fld>
             <a:endParaRPr lang="en-US"/>
           </a:p>
@@ -2811,7 +2816,7 @@
           <a:p>
             <a:fld id="{33175658-71C5-4CBA-8B43-B22F96899DB9}" type="datetimeFigureOut">
               <a:rPr lang="en-US" smtClean="0"/>
-              <a:t>9/15/2020</a:t>
+              <a:t>10/12/2020</a:t>
             </a:fld>
             <a:endParaRPr lang="en-US"/>
           </a:p>
@@ -3099,7 +3104,7 @@
           <a:p>
             <a:fld id="{33175658-71C5-4CBA-8B43-B22F96899DB9}" type="datetimeFigureOut">
               <a:rPr lang="en-US" smtClean="0"/>
-              <a:t>9/15/2020</a:t>
+              <a:t>10/12/2020</a:t>
             </a:fld>
             <a:endParaRPr lang="en-US"/>
           </a:p>
@@ -3340,7 +3345,7 @@
           <a:p>
             <a:fld id="{33175658-71C5-4CBA-8B43-B22F96899DB9}" type="datetimeFigureOut">
               <a:rPr lang="en-US" smtClean="0"/>
-              <a:t>9/15/2020</a:t>
+              <a:t>10/12/2020</a:t>
             </a:fld>
             <a:endParaRPr lang="en-US"/>
           </a:p>
@@ -5688,6 +5693,214 @@
           <a:p>
             <a:pPr algn="ctr"/>
             <a:endParaRPr lang="en-US"/>
+          </a:p>
+        </p:txBody>
+      </p:sp>
+      <p:sp>
+        <p:nvSpPr>
+          <p:cNvPr id="9" name="Oval 8">
+            <a:extLst>
+              <a:ext uri="{FF2B5EF4-FFF2-40B4-BE49-F238E27FC236}">
+                <a16:creationId xmlns:a16="http://schemas.microsoft.com/office/drawing/2014/main" id="{D5C82B20-3255-49A0-8FE2-857EC909BBD8}"/>
+              </a:ext>
+            </a:extLst>
+          </p:cNvPr>
+          <p:cNvSpPr/>
+          <p:nvPr/>
+        </p:nvSpPr>
+        <p:spPr>
+          <a:xfrm>
+            <a:off x="1757791" y="1252855"/>
+            <a:ext cx="477433" cy="493299"/>
+          </a:xfrm>
+          <a:prstGeom prst="ellipse">
+            <a:avLst/>
+          </a:prstGeom>
+          <a:solidFill>
+            <a:srgbClr val="CA3ECA"/>
+          </a:solidFill>
+        </p:spPr>
+        <p:style>
+          <a:lnRef idx="2">
+            <a:schemeClr val="accent1">
+              <a:shade val="50000"/>
+            </a:schemeClr>
+          </a:lnRef>
+          <a:fillRef idx="1">
+            <a:schemeClr val="accent1"/>
+          </a:fillRef>
+          <a:effectRef idx="0">
+            <a:schemeClr val="accent1"/>
+          </a:effectRef>
+          <a:fontRef idx="minor">
+            <a:schemeClr val="lt1"/>
+          </a:fontRef>
+        </p:style>
+        <p:txBody>
+          <a:bodyPr rtlCol="0" anchor="ctr"/>
+          <a:lstStyle/>
+          <a:p>
+            <a:pPr algn="ctr"/>
+            <a:r>
+              <a:rPr lang="en-US" sz="4000" b="1" dirty="0"/>
+              <a:t>1</a:t>
+            </a:r>
+          </a:p>
+        </p:txBody>
+      </p:sp>
+      <p:sp>
+        <p:nvSpPr>
+          <p:cNvPr id="59" name="Oval 58">
+            <a:extLst>
+              <a:ext uri="{FF2B5EF4-FFF2-40B4-BE49-F238E27FC236}">
+                <a16:creationId xmlns:a16="http://schemas.microsoft.com/office/drawing/2014/main" id="{DDF9F025-C44A-476D-879A-0092C64A0653}"/>
+              </a:ext>
+            </a:extLst>
+          </p:cNvPr>
+          <p:cNvSpPr/>
+          <p:nvPr/>
+        </p:nvSpPr>
+        <p:spPr>
+          <a:xfrm>
+            <a:off x="5366735" y="1283793"/>
+            <a:ext cx="477433" cy="493299"/>
+          </a:xfrm>
+          <a:prstGeom prst="ellipse">
+            <a:avLst/>
+          </a:prstGeom>
+          <a:solidFill>
+            <a:srgbClr val="CA3ECA"/>
+          </a:solidFill>
+        </p:spPr>
+        <p:style>
+          <a:lnRef idx="2">
+            <a:schemeClr val="accent1">
+              <a:shade val="50000"/>
+            </a:schemeClr>
+          </a:lnRef>
+          <a:fillRef idx="1">
+            <a:schemeClr val="accent1"/>
+          </a:fillRef>
+          <a:effectRef idx="0">
+            <a:schemeClr val="accent1"/>
+          </a:effectRef>
+          <a:fontRef idx="minor">
+            <a:schemeClr val="lt1"/>
+          </a:fontRef>
+        </p:style>
+        <p:txBody>
+          <a:bodyPr rtlCol="0" anchor="ctr"/>
+          <a:lstStyle/>
+          <a:p>
+            <a:pPr algn="ctr"/>
+            <a:r>
+              <a:rPr lang="en-US" sz="4000" b="1" dirty="0"/>
+              <a:t>2</a:t>
+            </a:r>
+          </a:p>
+        </p:txBody>
+      </p:sp>
+      <p:sp>
+        <p:nvSpPr>
+          <p:cNvPr id="60" name="Oval 59">
+            <a:extLst>
+              <a:ext uri="{FF2B5EF4-FFF2-40B4-BE49-F238E27FC236}">
+                <a16:creationId xmlns:a16="http://schemas.microsoft.com/office/drawing/2014/main" id="{956C33E4-41E8-480A-8EAE-3143C177F953}"/>
+              </a:ext>
+            </a:extLst>
+          </p:cNvPr>
+          <p:cNvSpPr/>
+          <p:nvPr/>
+        </p:nvSpPr>
+        <p:spPr>
+          <a:xfrm>
+            <a:off x="7668768" y="6076088"/>
+            <a:ext cx="477433" cy="493299"/>
+          </a:xfrm>
+          <a:prstGeom prst="ellipse">
+            <a:avLst/>
+          </a:prstGeom>
+          <a:solidFill>
+            <a:srgbClr val="CA3ECA"/>
+          </a:solidFill>
+        </p:spPr>
+        <p:style>
+          <a:lnRef idx="2">
+            <a:schemeClr val="accent1">
+              <a:shade val="50000"/>
+            </a:schemeClr>
+          </a:lnRef>
+          <a:fillRef idx="1">
+            <a:schemeClr val="accent1"/>
+          </a:fillRef>
+          <a:effectRef idx="0">
+            <a:schemeClr val="accent1"/>
+          </a:effectRef>
+          <a:fontRef idx="minor">
+            <a:schemeClr val="lt1"/>
+          </a:fontRef>
+        </p:style>
+        <p:txBody>
+          <a:bodyPr rtlCol="0" anchor="ctr"/>
+          <a:lstStyle/>
+          <a:p>
+            <a:pPr algn="ctr"/>
+            <a:r>
+              <a:rPr lang="en-US" sz="4000" b="1" dirty="0"/>
+              <a:t>4</a:t>
+            </a:r>
+          </a:p>
+        </p:txBody>
+      </p:sp>
+      <p:sp>
+        <p:nvSpPr>
+          <p:cNvPr id="61" name="Oval 60">
+            <a:extLst>
+              <a:ext uri="{FF2B5EF4-FFF2-40B4-BE49-F238E27FC236}">
+                <a16:creationId xmlns:a16="http://schemas.microsoft.com/office/drawing/2014/main" id="{31609A51-451C-4CA2-B453-ABFFEFEDFED3}"/>
+              </a:ext>
+            </a:extLst>
+          </p:cNvPr>
+          <p:cNvSpPr/>
+          <p:nvPr/>
+        </p:nvSpPr>
+        <p:spPr>
+          <a:xfrm>
+            <a:off x="9416423" y="2491206"/>
+            <a:ext cx="477433" cy="493299"/>
+          </a:xfrm>
+          <a:prstGeom prst="ellipse">
+            <a:avLst/>
+          </a:prstGeom>
+          <a:solidFill>
+            <a:srgbClr val="CA3ECA"/>
+          </a:solidFill>
+        </p:spPr>
+        <p:style>
+          <a:lnRef idx="2">
+            <a:schemeClr val="accent1">
+              <a:shade val="50000"/>
+            </a:schemeClr>
+          </a:lnRef>
+          <a:fillRef idx="1">
+            <a:schemeClr val="accent1"/>
+          </a:fillRef>
+          <a:effectRef idx="0">
+            <a:schemeClr val="accent1"/>
+          </a:effectRef>
+          <a:fontRef idx="minor">
+            <a:schemeClr val="lt1"/>
+          </a:fontRef>
+        </p:style>
+        <p:txBody>
+          <a:bodyPr rtlCol="0" anchor="ctr"/>
+          <a:lstStyle/>
+          <a:p>
+            <a:pPr algn="ctr"/>
+            <a:r>
+              <a:rPr lang="en-US" sz="4000" b="1" dirty="0"/>
+              <a:t>3</a:t>
+            </a:r>
           </a:p>
         </p:txBody>
       </p:sp>

</xml_diff>